<commit_message>
Added more plots to my notebook
</commit_message>
<xml_diff>
--- a/datasets/kidney_data/RNA-seq Challenge.pptx
+++ b/datasets/kidney_data/RNA-seq Challenge.pptx
@@ -132,6 +132,35 @@
 </p:presentation>
 </file>
 
+<file path=ppt/changesInfos/changesInfo1.xml><?xml version="1.0" encoding="utf-8"?>
+<pc:chgInfo xmlns:a="http://schemas.openxmlformats.org/drawingml/2006/main" xmlns:r="http://schemas.openxmlformats.org/officeDocument/2006/relationships" xmlns:ac="http://schemas.microsoft.com/office/drawing/2013/main/command" xmlns:pc="http://schemas.microsoft.com/office/powerpoint/2013/main/command">
+  <pc:docChgLst>
+    <pc:chgData name="Aldwin Arambulo" userId="a4b89f20-39a5-48c8-b1f4-dfea7aa0a3de" providerId="ADAL" clId="{BE8F6BA9-52DC-4177-8661-22AB91673C1C}"/>
+    <pc:docChg chg="modSld">
+      <pc:chgData name="Aldwin Arambulo" userId="a4b89f20-39a5-48c8-b1f4-dfea7aa0a3de" providerId="ADAL" clId="{BE8F6BA9-52DC-4177-8661-22AB91673C1C}" dt="2023-09-23T04:52:27.955" v="0" actId="1036"/>
+      <pc:docMkLst>
+        <pc:docMk/>
+      </pc:docMkLst>
+      <pc:sldChg chg="modSp mod">
+        <pc:chgData name="Aldwin Arambulo" userId="a4b89f20-39a5-48c8-b1f4-dfea7aa0a3de" providerId="ADAL" clId="{BE8F6BA9-52DC-4177-8661-22AB91673C1C}" dt="2023-09-23T04:52:27.955" v="0" actId="1036"/>
+        <pc:sldMkLst>
+          <pc:docMk/>
+          <pc:sldMk cId="560844803" sldId="256"/>
+        </pc:sldMkLst>
+        <pc:spChg chg="mod">
+          <ac:chgData name="Aldwin Arambulo" userId="a4b89f20-39a5-48c8-b1f4-dfea7aa0a3de" providerId="ADAL" clId="{BE8F6BA9-52DC-4177-8661-22AB91673C1C}" dt="2023-09-23T04:52:27.955" v="0" actId="1036"/>
+          <ac:spMkLst>
+            <pc:docMk/>
+            <pc:sldMk cId="560844803" sldId="256"/>
+            <ac:spMk id="3" creationId="{DDC75C10-987B-C832-1CC2-2BA73604B4AF}"/>
+          </ac:spMkLst>
+        </pc:spChg>
+      </pc:sldChg>
+    </pc:docChg>
+  </pc:docChgLst>
+</pc:chgInfo>
+</file>
+
 <file path=ppt/slideLayouts/slideLayout1.xml><?xml version="1.0" encoding="utf-8"?>
 <p:sldLayout xmlns:a="http://schemas.openxmlformats.org/drawingml/2006/main" xmlns:r="http://schemas.openxmlformats.org/officeDocument/2006/relationships" xmlns:p="http://schemas.openxmlformats.org/presentationml/2006/main" type="title" preserve="1">
   <p:cSld name="Title Slide">
@@ -281,7 +310,7 @@
           <a:p>
             <a:fld id="{48E8DE64-5D68-48C3-AFE7-9A0C7EB279B4}" type="datetimeFigureOut">
               <a:rPr lang="en-AU" smtClean="0"/>
-              <a:t>20/09/2023</a:t>
+              <a:t>23/09/2023</a:t>
             </a:fld>
             <a:endParaRPr lang="en-AU"/>
           </a:p>
@@ -481,7 +510,7 @@
           <a:p>
             <a:fld id="{48E8DE64-5D68-48C3-AFE7-9A0C7EB279B4}" type="datetimeFigureOut">
               <a:rPr lang="en-AU" smtClean="0"/>
-              <a:t>20/09/2023</a:t>
+              <a:t>23/09/2023</a:t>
             </a:fld>
             <a:endParaRPr lang="en-AU"/>
           </a:p>
@@ -691,7 +720,7 @@
           <a:p>
             <a:fld id="{48E8DE64-5D68-48C3-AFE7-9A0C7EB279B4}" type="datetimeFigureOut">
               <a:rPr lang="en-AU" smtClean="0"/>
-              <a:t>20/09/2023</a:t>
+              <a:t>23/09/2023</a:t>
             </a:fld>
             <a:endParaRPr lang="en-AU"/>
           </a:p>
@@ -891,7 +920,7 @@
           <a:p>
             <a:fld id="{48E8DE64-5D68-48C3-AFE7-9A0C7EB279B4}" type="datetimeFigureOut">
               <a:rPr lang="en-AU" smtClean="0"/>
-              <a:t>20/09/2023</a:t>
+              <a:t>23/09/2023</a:t>
             </a:fld>
             <a:endParaRPr lang="en-AU"/>
           </a:p>
@@ -1167,7 +1196,7 @@
           <a:p>
             <a:fld id="{48E8DE64-5D68-48C3-AFE7-9A0C7EB279B4}" type="datetimeFigureOut">
               <a:rPr lang="en-AU" smtClean="0"/>
-              <a:t>20/09/2023</a:t>
+              <a:t>23/09/2023</a:t>
             </a:fld>
             <a:endParaRPr lang="en-AU"/>
           </a:p>
@@ -1435,7 +1464,7 @@
           <a:p>
             <a:fld id="{48E8DE64-5D68-48C3-AFE7-9A0C7EB279B4}" type="datetimeFigureOut">
               <a:rPr lang="en-AU" smtClean="0"/>
-              <a:t>20/09/2023</a:t>
+              <a:t>23/09/2023</a:t>
             </a:fld>
             <a:endParaRPr lang="en-AU"/>
           </a:p>
@@ -1850,7 +1879,7 @@
           <a:p>
             <a:fld id="{48E8DE64-5D68-48C3-AFE7-9A0C7EB279B4}" type="datetimeFigureOut">
               <a:rPr lang="en-AU" smtClean="0"/>
-              <a:t>20/09/2023</a:t>
+              <a:t>23/09/2023</a:t>
             </a:fld>
             <a:endParaRPr lang="en-AU"/>
           </a:p>
@@ -1992,7 +2021,7 @@
           <a:p>
             <a:fld id="{48E8DE64-5D68-48C3-AFE7-9A0C7EB279B4}" type="datetimeFigureOut">
               <a:rPr lang="en-AU" smtClean="0"/>
-              <a:t>20/09/2023</a:t>
+              <a:t>23/09/2023</a:t>
             </a:fld>
             <a:endParaRPr lang="en-AU"/>
           </a:p>
@@ -2105,7 +2134,7 @@
           <a:p>
             <a:fld id="{48E8DE64-5D68-48C3-AFE7-9A0C7EB279B4}" type="datetimeFigureOut">
               <a:rPr lang="en-AU" smtClean="0"/>
-              <a:t>20/09/2023</a:t>
+              <a:t>23/09/2023</a:t>
             </a:fld>
             <a:endParaRPr lang="en-AU"/>
           </a:p>
@@ -2418,7 +2447,7 @@
           <a:p>
             <a:fld id="{48E8DE64-5D68-48C3-AFE7-9A0C7EB279B4}" type="datetimeFigureOut">
               <a:rPr lang="en-AU" smtClean="0"/>
-              <a:t>20/09/2023</a:t>
+              <a:t>23/09/2023</a:t>
             </a:fld>
             <a:endParaRPr lang="en-AU"/>
           </a:p>
@@ -2707,7 +2736,7 @@
           <a:p>
             <a:fld id="{48E8DE64-5D68-48C3-AFE7-9A0C7EB279B4}" type="datetimeFigureOut">
               <a:rPr lang="en-AU" smtClean="0"/>
-              <a:t>20/09/2023</a:t>
+              <a:t>23/09/2023</a:t>
             </a:fld>
             <a:endParaRPr lang="en-AU"/>
           </a:p>
@@ -2950,7 +2979,7 @@
           <a:p>
             <a:fld id="{48E8DE64-5D68-48C3-AFE7-9A0C7EB279B4}" type="datetimeFigureOut">
               <a:rPr lang="en-AU" smtClean="0"/>
-              <a:t>20/09/2023</a:t>
+              <a:t>23/09/2023</a:t>
             </a:fld>
             <a:endParaRPr lang="en-AU"/>
           </a:p>
@@ -3411,7 +3440,12 @@
             <p:ph type="subTitle" idx="1"/>
           </p:nvPr>
         </p:nvSpPr>
-        <p:spPr/>
+        <p:spPr>
+          <a:xfrm>
+            <a:off x="1524000" y="3611369"/>
+            <a:ext cx="9144000" cy="1655762"/>
+          </a:xfrm>
+        </p:spPr>
         <p:txBody>
           <a:bodyPr/>
           <a:lstStyle/>

</xml_diff>